<commit_message>
Làm Screen Design Cover, Tạo hoá đơn, Thống kê doanh thu
</commit_message>
<xml_diff>
--- a/Screen Design document/Screen_Diagram.pptx
+++ b/Screen Design document/Screen_Diagram.pptx
@@ -243,7 +243,7 @@
           <a:p>
             <a:fld id="{49291495-F709-4C09-B1B6-B97169AFAC42}" type="datetimeFigureOut">
               <a:rPr lang="en-US" smtClean="0"/>
-              <a:t>14/03/2017</a:t>
+              <a:t>16/03/2017</a:t>
             </a:fld>
             <a:endParaRPr lang="en-US"/>
           </a:p>
@@ -413,7 +413,7 @@
           <a:p>
             <a:fld id="{49291495-F709-4C09-B1B6-B97169AFAC42}" type="datetimeFigureOut">
               <a:rPr lang="en-US" smtClean="0"/>
-              <a:t>14/03/2017</a:t>
+              <a:t>16/03/2017</a:t>
             </a:fld>
             <a:endParaRPr lang="en-US"/>
           </a:p>
@@ -593,7 +593,7 @@
           <a:p>
             <a:fld id="{49291495-F709-4C09-B1B6-B97169AFAC42}" type="datetimeFigureOut">
               <a:rPr lang="en-US" smtClean="0"/>
-              <a:t>14/03/2017</a:t>
+              <a:t>16/03/2017</a:t>
             </a:fld>
             <a:endParaRPr lang="en-US"/>
           </a:p>
@@ -763,7 +763,7 @@
           <a:p>
             <a:fld id="{49291495-F709-4C09-B1B6-B97169AFAC42}" type="datetimeFigureOut">
               <a:rPr lang="en-US" smtClean="0"/>
-              <a:t>14/03/2017</a:t>
+              <a:t>16/03/2017</a:t>
             </a:fld>
             <a:endParaRPr lang="en-US"/>
           </a:p>
@@ -1009,7 +1009,7 @@
           <a:p>
             <a:fld id="{49291495-F709-4C09-B1B6-B97169AFAC42}" type="datetimeFigureOut">
               <a:rPr lang="en-US" smtClean="0"/>
-              <a:t>14/03/2017</a:t>
+              <a:t>16/03/2017</a:t>
             </a:fld>
             <a:endParaRPr lang="en-US"/>
           </a:p>
@@ -1241,7 +1241,7 @@
           <a:p>
             <a:fld id="{49291495-F709-4C09-B1B6-B97169AFAC42}" type="datetimeFigureOut">
               <a:rPr lang="en-US" smtClean="0"/>
-              <a:t>14/03/2017</a:t>
+              <a:t>16/03/2017</a:t>
             </a:fld>
             <a:endParaRPr lang="en-US"/>
           </a:p>
@@ -1608,7 +1608,7 @@
           <a:p>
             <a:fld id="{49291495-F709-4C09-B1B6-B97169AFAC42}" type="datetimeFigureOut">
               <a:rPr lang="en-US" smtClean="0"/>
-              <a:t>14/03/2017</a:t>
+              <a:t>16/03/2017</a:t>
             </a:fld>
             <a:endParaRPr lang="en-US"/>
           </a:p>
@@ -1726,7 +1726,7 @@
           <a:p>
             <a:fld id="{49291495-F709-4C09-B1B6-B97169AFAC42}" type="datetimeFigureOut">
               <a:rPr lang="en-US" smtClean="0"/>
-              <a:t>14/03/2017</a:t>
+              <a:t>16/03/2017</a:t>
             </a:fld>
             <a:endParaRPr lang="en-US"/>
           </a:p>
@@ -1821,7 +1821,7 @@
           <a:p>
             <a:fld id="{49291495-F709-4C09-B1B6-B97169AFAC42}" type="datetimeFigureOut">
               <a:rPr lang="en-US" smtClean="0"/>
-              <a:t>14/03/2017</a:t>
+              <a:t>16/03/2017</a:t>
             </a:fld>
             <a:endParaRPr lang="en-US"/>
           </a:p>
@@ -2098,7 +2098,7 @@
           <a:p>
             <a:fld id="{49291495-F709-4C09-B1B6-B97169AFAC42}" type="datetimeFigureOut">
               <a:rPr lang="en-US" smtClean="0"/>
-              <a:t>14/03/2017</a:t>
+              <a:t>16/03/2017</a:t>
             </a:fld>
             <a:endParaRPr lang="en-US"/>
           </a:p>
@@ -2351,7 +2351,7 @@
           <a:p>
             <a:fld id="{49291495-F709-4C09-B1B6-B97169AFAC42}" type="datetimeFigureOut">
               <a:rPr lang="en-US" smtClean="0"/>
-              <a:t>14/03/2017</a:t>
+              <a:t>16/03/2017</a:t>
             </a:fld>
             <a:endParaRPr lang="en-US"/>
           </a:p>
@@ -2564,7 +2564,7 @@
           <a:p>
             <a:fld id="{49291495-F709-4C09-B1B6-B97169AFAC42}" type="datetimeFigureOut">
               <a:rPr lang="en-US" smtClean="0"/>
-              <a:t>14/03/2017</a:t>
+              <a:t>16/03/2017</a:t>
             </a:fld>
             <a:endParaRPr lang="en-US"/>
           </a:p>
@@ -3339,7 +3339,7 @@
         </p:nvSpPr>
         <p:spPr>
           <a:xfrm>
-            <a:off x="7762411" y="3814592"/>
+            <a:off x="9452388" y="3800358"/>
             <a:ext cx="2295989" cy="594575"/>
           </a:xfrm>
           <a:prstGeom prst="rect">
@@ -3369,7 +3369,19 @@
             <a:pPr algn="ctr"/>
             <a:r>
               <a:rPr lang="en-US" sz="2000" dirty="0" err="1" smtClean="0"/>
-              <a:t>Doanh</a:t>
+              <a:t>Xem</a:t>
+            </a:r>
+            <a:r>
+              <a:rPr lang="en-US" sz="2000" dirty="0" smtClean="0"/>
+              <a:t> </a:t>
+            </a:r>
+            <a:r>
+              <a:rPr lang="en-US" sz="2000" dirty="0" err="1" smtClean="0"/>
+              <a:t>d</a:t>
+            </a:r>
+            <a:r>
+              <a:rPr lang="en-US" sz="2000" dirty="0" err="1" smtClean="0"/>
+              <a:t>oanh</a:t>
             </a:r>
             <a:r>
               <a:rPr lang="en-US" sz="2000" dirty="0" smtClean="0"/>
@@ -3391,7 +3403,7 @@
         </p:nvSpPr>
         <p:spPr>
           <a:xfrm>
-            <a:off x="7800706" y="5262305"/>
+            <a:off x="9490683" y="5248071"/>
             <a:ext cx="2257694" cy="594575"/>
           </a:xfrm>
           <a:prstGeom prst="rect">
@@ -3459,7 +3471,7 @@
         </p:nvSpPr>
         <p:spPr>
           <a:xfrm>
-            <a:off x="7800706" y="6091917"/>
+            <a:off x="9490683" y="6077683"/>
             <a:ext cx="2257694" cy="594575"/>
           </a:xfrm>
           <a:prstGeom prst="rect">
@@ -3528,7 +3540,7 @@
         <p:spPr>
           <a:xfrm>
             <a:off x="1503246" y="5798454"/>
-            <a:ext cx="813981" cy="888038"/>
+            <a:ext cx="1111165" cy="888038"/>
           </a:xfrm>
           <a:prstGeom prst="rect">
             <a:avLst/>
@@ -3556,15 +3568,19 @@
           <a:p>
             <a:pPr algn="ctr"/>
             <a:r>
-              <a:rPr lang="en-US" dirty="0" smtClean="0"/>
-              <a:t>Tab </a:t>
-            </a:r>
-            <a:r>
-              <a:rPr lang="en-US" dirty="0" err="1" smtClean="0"/>
+              <a:rPr lang="en-US" dirty="0" err="1"/>
+              <a:t>Thông</a:t>
+            </a:r>
+            <a:r>
+              <a:rPr lang="en-US" dirty="0"/>
+              <a:t> tin </a:t>
+            </a:r>
+            <a:r>
+              <a:rPr lang="en-US" dirty="0" err="1"/>
               <a:t>Khách</a:t>
             </a:r>
             <a:r>
-              <a:rPr lang="en-US" dirty="0" smtClean="0"/>
+              <a:rPr lang="en-US" dirty="0"/>
               <a:t> </a:t>
             </a:r>
             <a:r>
@@ -3583,8 +3599,8 @@
         </p:nvSpPr>
         <p:spPr>
           <a:xfrm>
-            <a:off x="2890430" y="5798454"/>
-            <a:ext cx="782531" cy="888038"/>
+            <a:off x="2787160" y="5798454"/>
+            <a:ext cx="1238496" cy="888038"/>
           </a:xfrm>
           <a:prstGeom prst="rect">
             <a:avLst/>
@@ -3612,15 +3628,19 @@
           <a:p>
             <a:pPr algn="ctr"/>
             <a:r>
-              <a:rPr lang="en-US" sz="2000" dirty="0" smtClean="0"/>
-              <a:t>Tab </a:t>
-            </a:r>
-            <a:r>
-              <a:rPr lang="en-US" sz="2000" dirty="0" err="1" smtClean="0"/>
+              <a:rPr lang="en-US" sz="2000" dirty="0" err="1"/>
+              <a:t>Thông</a:t>
+            </a:r>
+            <a:r>
+              <a:rPr lang="en-US" sz="2000" dirty="0"/>
+              <a:t> tin </a:t>
+            </a:r>
+            <a:r>
+              <a:rPr lang="en-US" sz="2000" dirty="0" err="1"/>
               <a:t>Sản</a:t>
             </a:r>
             <a:r>
-              <a:rPr lang="en-US" sz="2000" dirty="0" smtClean="0"/>
+              <a:rPr lang="en-US" sz="2000" dirty="0"/>
               <a:t> </a:t>
             </a:r>
             <a:r>
@@ -3640,7 +3660,7 @@
         <p:spPr>
           <a:xfrm>
             <a:off x="4109029" y="5798454"/>
-            <a:ext cx="1106177" cy="872888"/>
+            <a:ext cx="1255711" cy="872888"/>
           </a:xfrm>
           <a:prstGeom prst="rect">
             <a:avLst/>
@@ -3668,15 +3688,19 @@
           <a:p>
             <a:pPr algn="ctr"/>
             <a:r>
-              <a:rPr lang="en-US" sz="2000" dirty="0" smtClean="0"/>
-              <a:t>Tab </a:t>
-            </a:r>
-            <a:r>
-              <a:rPr lang="en-US" sz="2000" dirty="0" err="1" smtClean="0"/>
+              <a:rPr lang="en-US" sz="2000" dirty="0" err="1"/>
+              <a:t>Thông</a:t>
+            </a:r>
+            <a:r>
+              <a:rPr lang="en-US" sz="2000" dirty="0"/>
+              <a:t> tin </a:t>
+            </a:r>
+            <a:r>
+              <a:rPr lang="en-US" sz="2000" dirty="0" err="1"/>
               <a:t>Nguyên</a:t>
             </a:r>
             <a:r>
-              <a:rPr lang="en-US" sz="2000" dirty="0" smtClean="0"/>
+              <a:rPr lang="en-US" sz="2000" dirty="0"/>
               <a:t> </a:t>
             </a:r>
             <a:r>
@@ -3727,14 +3751,15 @@
         <p:nvCxnSpPr>
           <p:cNvPr id="60" name="Straight Arrow Connector 54"/>
           <p:cNvCxnSpPr>
+            <a:stCxn id="5" idx="2"/>
             <a:endCxn id="37" idx="0"/>
           </p:cNvCxnSpPr>
           <p:nvPr/>
         </p:nvCxnSpPr>
         <p:spPr>
           <a:xfrm rot="16200000" flipH="1">
-            <a:off x="2815661" y="3951997"/>
-            <a:ext cx="941032" cy="2751882"/>
+            <a:off x="1733367" y="2794935"/>
+            <a:ext cx="2184553" cy="3822484"/>
           </a:xfrm>
           <a:prstGeom prst="bentConnector3">
             <a:avLst>
@@ -3771,8 +3796,8 @@
         </p:nvCxnSpPr>
         <p:spPr>
           <a:xfrm rot="16200000" flipH="1">
-            <a:off x="320043" y="4208259"/>
-            <a:ext cx="2184553" cy="995836"/>
+            <a:off x="394339" y="4133963"/>
+            <a:ext cx="2184553" cy="1144428"/>
           </a:xfrm>
           <a:prstGeom prst="bentConnector3">
             <a:avLst>
@@ -3913,19 +3938,17 @@
         <p:nvCxnSpPr>
           <p:cNvPr id="105" name="Straight Arrow Connector 54"/>
           <p:cNvCxnSpPr>
-            <a:endCxn id="10" idx="1"/>
+            <a:endCxn id="65" idx="1"/>
           </p:cNvCxnSpPr>
           <p:nvPr/>
         </p:nvCxnSpPr>
         <p:spPr>
-          <a:xfrm>
-            <a:off x="1933549" y="3423958"/>
-            <a:ext cx="5828862" cy="687922"/>
-          </a:xfrm>
-          <a:prstGeom prst="bentConnector3">
-            <a:avLst>
-              <a:gd name="adj1" fmla="val 69002"/>
-            </a:avLst>
+          <a:xfrm rot="5400000" flipH="1" flipV="1">
+            <a:off x="8680581" y="3295715"/>
+            <a:ext cx="872022" cy="692159"/>
+          </a:xfrm>
+          <a:prstGeom prst="bentConnector2">
+            <a:avLst/>
           </a:prstGeom>
           <a:ln w="57150">
             <a:tailEnd type="triangle"/>
@@ -3956,7 +3979,7 @@
         </p:nvCxnSpPr>
         <p:spPr>
           <a:xfrm>
-            <a:off x="1840608" y="3423960"/>
+            <a:off x="3530585" y="3409726"/>
             <a:ext cx="5960098" cy="2135633"/>
           </a:xfrm>
           <a:prstGeom prst="bentConnector3">
@@ -3986,17 +4009,19 @@
       <p:cxnSp>
         <p:nvCxnSpPr>
           <p:cNvPr id="120" name="Straight Arrow Connector 54"/>
-          <p:cNvCxnSpPr/>
+          <p:cNvCxnSpPr>
+            <a:endCxn id="12" idx="1"/>
+          </p:cNvCxnSpPr>
           <p:nvPr/>
         </p:nvCxnSpPr>
         <p:spPr>
           <a:xfrm>
             <a:off x="1802167" y="3382795"/>
-            <a:ext cx="5960098" cy="2965245"/>
+            <a:ext cx="7688516" cy="2992176"/>
           </a:xfrm>
           <a:prstGeom prst="bentConnector3">
             <a:avLst>
-              <a:gd name="adj1" fmla="val 69664"/>
+              <a:gd name="adj1" fmla="val 75964"/>
             </a:avLst>
           </a:prstGeom>
           <a:ln w="57150">
@@ -4027,7 +4052,7 @@
         <p:spPr>
           <a:xfrm>
             <a:off x="-29791" y="5773751"/>
-            <a:ext cx="914399" cy="922294"/>
+            <a:ext cx="1171245" cy="922294"/>
           </a:xfrm>
           <a:prstGeom prst="rect">
             <a:avLst/>
@@ -4055,8 +4080,20 @@
           <a:p>
             <a:pPr algn="ctr"/>
             <a:r>
+              <a:rPr lang="en-US" sz="2000" dirty="0" err="1" smtClean="0"/>
+              <a:t>Thông</a:t>
+            </a:r>
+            <a:r>
               <a:rPr lang="en-US" sz="2000" dirty="0" smtClean="0"/>
-              <a:t>Tab </a:t>
+              <a:t> </a:t>
+            </a:r>
+            <a:r>
+              <a:rPr lang="en-US" sz="2000" dirty="0" smtClean="0"/>
+              <a:t>tin</a:t>
+            </a:r>
+            <a:r>
+              <a:rPr lang="en-US" sz="2000" dirty="0" smtClean="0"/>
+              <a:t> </a:t>
             </a:r>
             <a:r>
               <a:rPr lang="en-US" sz="2000" dirty="0" err="1" smtClean="0"/>
@@ -4392,7 +4429,7 @@
         </p:nvSpPr>
         <p:spPr>
           <a:xfrm>
-            <a:off x="5896794" y="3811944"/>
+            <a:off x="7615397" y="3762405"/>
             <a:ext cx="1295869" cy="261610"/>
           </a:xfrm>
           <a:prstGeom prst="rect">
@@ -4437,7 +4474,7 @@
         </p:nvSpPr>
         <p:spPr>
           <a:xfrm>
-            <a:off x="5896794" y="5274926"/>
+            <a:off x="7618440" y="5316409"/>
             <a:ext cx="1782098" cy="261610"/>
           </a:xfrm>
           <a:prstGeom prst="rect">
@@ -4498,7 +4535,7 @@
         </p:nvSpPr>
         <p:spPr>
           <a:xfrm>
-            <a:off x="5983988" y="6021874"/>
+            <a:off x="7646319" y="6124145"/>
             <a:ext cx="1694903" cy="261610"/>
           </a:xfrm>
           <a:prstGeom prst="rect">
@@ -4559,8 +4596,8 @@
         </p:nvSpPr>
         <p:spPr>
           <a:xfrm>
-            <a:off x="914400" y="3663659"/>
-            <a:ext cx="682580" cy="1107996"/>
+            <a:off x="0" y="3589199"/>
+            <a:ext cx="1054030" cy="600164"/>
           </a:xfrm>
           <a:prstGeom prst="rect">
             <a:avLst/>
@@ -4616,14 +4653,15 @@
         <p:nvCxnSpPr>
           <p:cNvPr id="239" name="Straight Arrow Connector 54"/>
           <p:cNvCxnSpPr>
+            <a:stCxn id="5" idx="2"/>
             <a:endCxn id="192" idx="0"/>
           </p:cNvCxnSpPr>
           <p:nvPr/>
         </p:nvCxnSpPr>
         <p:spPr>
           <a:xfrm rot="5400000">
-            <a:off x="710659" y="4574173"/>
-            <a:ext cx="916329" cy="1482827"/>
+            <a:off x="-344808" y="4514542"/>
+            <a:ext cx="2159850" cy="358569"/>
           </a:xfrm>
           <a:prstGeom prst="bentConnector3">
             <a:avLst>
@@ -4653,14 +4691,15 @@
         <p:nvCxnSpPr>
           <p:cNvPr id="272" name="Straight Arrow Connector 54"/>
           <p:cNvCxnSpPr>
+            <a:stCxn id="5" idx="2"/>
             <a:endCxn id="36" idx="0"/>
           </p:cNvCxnSpPr>
           <p:nvPr/>
         </p:nvCxnSpPr>
         <p:spPr>
           <a:xfrm rot="16200000" flipH="1">
-            <a:off x="2125450" y="4642208"/>
-            <a:ext cx="941032" cy="1371460"/>
+            <a:off x="1068128" y="3460173"/>
+            <a:ext cx="2184553" cy="2492007"/>
           </a:xfrm>
           <a:prstGeom prst="bentConnector3">
             <a:avLst>
@@ -4785,7 +4824,7 @@
         </p:nvSpPr>
         <p:spPr>
           <a:xfrm>
-            <a:off x="4638188" y="5428787"/>
+            <a:off x="4729949" y="4784538"/>
             <a:ext cx="1345800" cy="261610"/>
           </a:xfrm>
           <a:prstGeom prst="rect">
@@ -4830,7 +4869,7 @@
         </p:nvSpPr>
         <p:spPr>
           <a:xfrm>
-            <a:off x="3266727" y="5392711"/>
+            <a:off x="3341737" y="4775326"/>
             <a:ext cx="1345800" cy="261610"/>
           </a:xfrm>
           <a:prstGeom prst="rect">
@@ -4875,7 +4914,7 @@
         </p:nvSpPr>
         <p:spPr>
           <a:xfrm>
-            <a:off x="1861085" y="5405731"/>
+            <a:off x="2019961" y="4758972"/>
             <a:ext cx="1345800" cy="261610"/>
           </a:xfrm>
           <a:prstGeom prst="rect">
@@ -4920,7 +4959,7 @@
         </p:nvSpPr>
         <p:spPr>
           <a:xfrm>
-            <a:off x="440411" y="5381336"/>
+            <a:off x="529689" y="4749845"/>
             <a:ext cx="1345800" cy="261610"/>
           </a:xfrm>
           <a:prstGeom prst="rect">
@@ -4995,7 +5034,7 @@
             <a:pPr algn="ctr"/>
             <a:r>
               <a:rPr lang="en-US" sz="2000" dirty="0" err="1" smtClean="0"/>
-              <a:t>Chọn</a:t>
+              <a:t>Thêm</a:t>
             </a:r>
             <a:r>
               <a:rPr lang="en-US" sz="2000" dirty="0" smtClean="0"/>
@@ -5054,19 +5093,19 @@
           <a:p>
             <a:pPr algn="ctr"/>
             <a:r>
-              <a:rPr lang="en-US" sz="2000" dirty="0" err="1" smtClean="0"/>
-              <a:t>Chọn</a:t>
-            </a:r>
-            <a:r>
-              <a:rPr lang="en-US" sz="2000" dirty="0" smtClean="0"/>
-              <a:t> </a:t>
-            </a:r>
-            <a:r>
-              <a:rPr lang="en-US" sz="2000" dirty="0" err="1" smtClean="0"/>
+              <a:rPr lang="en-US" sz="2000" dirty="0" err="1"/>
+              <a:t>Thêm</a:t>
+            </a:r>
+            <a:r>
+              <a:rPr lang="en-US" sz="2000" dirty="0"/>
+              <a:t> </a:t>
+            </a:r>
+            <a:r>
+              <a:rPr lang="en-US" sz="2000" dirty="0" err="1"/>
               <a:t>thức</a:t>
             </a:r>
             <a:r>
-              <a:rPr lang="en-US" sz="2000" dirty="0" smtClean="0"/>
+              <a:rPr lang="en-US" sz="2000" dirty="0"/>
               <a:t> </a:t>
             </a:r>
             <a:r>
@@ -5283,7 +5322,7 @@
         </p:nvSpPr>
         <p:spPr>
           <a:xfrm>
-            <a:off x="7778773" y="4514239"/>
+            <a:off x="9468750" y="4500005"/>
             <a:ext cx="2279627" cy="594575"/>
           </a:xfrm>
           <a:prstGeom prst="rect">
@@ -5313,7 +5352,7 @@
             <a:pPr algn="ctr"/>
             <a:r>
               <a:rPr lang="en-US" sz="2000" dirty="0" err="1" smtClean="0"/>
-              <a:t>Thống</a:t>
+              <a:t>Tình</a:t>
             </a:r>
             <a:r>
               <a:rPr lang="en-US" sz="2000" dirty="0" smtClean="0"/>
@@ -5321,7 +5360,7 @@
             </a:r>
             <a:r>
               <a:rPr lang="en-US" sz="2000" dirty="0" err="1" smtClean="0"/>
-              <a:t>kê</a:t>
+              <a:t>hình</a:t>
             </a:r>
             <a:r>
               <a:rPr lang="en-US" sz="2000" dirty="0" smtClean="0"/>
@@ -5333,7 +5372,7 @@
             </a:r>
             <a:r>
               <a:rPr lang="en-US" sz="2000" dirty="0" smtClean="0"/>
-              <a:t>  </a:t>
+              <a:t> </a:t>
             </a:r>
             <a:r>
               <a:rPr lang="en-US" sz="2000" dirty="0" err="1" smtClean="0"/>
@@ -5346,17 +5385,19 @@
       <p:cxnSp>
         <p:nvCxnSpPr>
           <p:cNvPr id="59" name="Straight Arrow Connector 54"/>
-          <p:cNvCxnSpPr/>
+          <p:cNvCxnSpPr>
+            <a:endCxn id="58" idx="1"/>
+          </p:cNvCxnSpPr>
           <p:nvPr/>
         </p:nvCxnSpPr>
         <p:spPr>
           <a:xfrm>
-            <a:off x="1863919" y="3423959"/>
-            <a:ext cx="5914854" cy="1387568"/>
+            <a:off x="1802167" y="3424440"/>
+            <a:ext cx="7666583" cy="1372853"/>
           </a:xfrm>
           <a:prstGeom prst="bentConnector3">
             <a:avLst>
-              <a:gd name="adj1" fmla="val 68943"/>
+              <a:gd name="adj1" fmla="val 76206"/>
             </a:avLst>
           </a:prstGeom>
           <a:ln w="57150">
@@ -5386,7 +5427,7 @@
         </p:nvSpPr>
         <p:spPr>
           <a:xfrm>
-            <a:off x="5896794" y="4514115"/>
+            <a:off x="7602721" y="4541075"/>
             <a:ext cx="1782098" cy="261610"/>
           </a:xfrm>
           <a:prstGeom prst="rect">
@@ -5431,6 +5472,192 @@
             <a:r>
               <a:rPr lang="en-US" sz="1100" dirty="0" err="1" smtClean="0"/>
               <a:t>kho</a:t>
+            </a:r>
+            <a:r>
+              <a:rPr lang="en-US" sz="1100" dirty="0" smtClean="0"/>
+              <a:t>”</a:t>
+            </a:r>
+          </a:p>
+        </p:txBody>
+      </p:sp>
+      <p:sp>
+        <p:nvSpPr>
+          <p:cNvPr id="65" name="Rectangle 64"/>
+          <p:cNvSpPr/>
+          <p:nvPr/>
+        </p:nvSpPr>
+        <p:spPr>
+          <a:xfrm>
+            <a:off x="9462672" y="2908495"/>
+            <a:ext cx="2295989" cy="594575"/>
+          </a:xfrm>
+          <a:prstGeom prst="rect">
+            <a:avLst/>
+          </a:prstGeom>
+        </p:spPr>
+        <p:style>
+          <a:lnRef idx="2">
+            <a:schemeClr val="accent1">
+              <a:shade val="50000"/>
+            </a:schemeClr>
+          </a:lnRef>
+          <a:fillRef idx="1">
+            <a:schemeClr val="accent1"/>
+          </a:fillRef>
+          <a:effectRef idx="0">
+            <a:schemeClr val="accent1"/>
+          </a:effectRef>
+          <a:fontRef idx="minor">
+            <a:schemeClr val="lt1"/>
+          </a:fontRef>
+        </p:style>
+        <p:txBody>
+          <a:bodyPr rtlCol="0" anchor="ctr"/>
+          <a:lstStyle/>
+          <a:p>
+            <a:pPr algn="ctr"/>
+            <a:r>
+              <a:rPr lang="en-US" sz="2000" dirty="0" err="1" smtClean="0"/>
+              <a:t>Xem</a:t>
+            </a:r>
+            <a:r>
+              <a:rPr lang="en-US" sz="2000" dirty="0" smtClean="0"/>
+              <a:t> </a:t>
+            </a:r>
+            <a:r>
+              <a:rPr lang="en-US" sz="2000" dirty="0" err="1" smtClean="0"/>
+              <a:t>Sản</a:t>
+            </a:r>
+            <a:r>
+              <a:rPr lang="en-US" sz="2000" dirty="0" smtClean="0"/>
+              <a:t> </a:t>
+            </a:r>
+            <a:r>
+              <a:rPr lang="en-US" sz="2000" dirty="0" err="1" smtClean="0"/>
+              <a:t>phẩm</a:t>
+            </a:r>
+            <a:r>
+              <a:rPr lang="en-US" sz="2000" dirty="0" smtClean="0"/>
+              <a:t> </a:t>
+            </a:r>
+            <a:r>
+              <a:rPr lang="en-US" sz="2000" dirty="0" err="1" smtClean="0"/>
+              <a:t>bán</a:t>
+            </a:r>
+            <a:r>
+              <a:rPr lang="en-US" sz="2000" dirty="0" smtClean="0"/>
+              <a:t> </a:t>
+            </a:r>
+            <a:r>
+              <a:rPr lang="en-US" sz="2000" dirty="0" err="1" smtClean="0"/>
+              <a:t>được</a:t>
+            </a:r>
+            <a:endParaRPr lang="en-US" sz="2000" dirty="0" smtClean="0"/>
+          </a:p>
+        </p:txBody>
+      </p:sp>
+      <p:cxnSp>
+        <p:nvCxnSpPr>
+          <p:cNvPr id="70" name="Straight Arrow Connector 54"/>
+          <p:cNvCxnSpPr>
+            <a:endCxn id="10" idx="1"/>
+          </p:cNvCxnSpPr>
+          <p:nvPr/>
+        </p:nvCxnSpPr>
+        <p:spPr>
+          <a:xfrm>
+            <a:off x="2076641" y="3397998"/>
+            <a:ext cx="7375747" cy="699648"/>
+          </a:xfrm>
+          <a:prstGeom prst="bentConnector3">
+            <a:avLst>
+              <a:gd name="adj1" fmla="val 75668"/>
+            </a:avLst>
+          </a:prstGeom>
+          <a:ln w="57150">
+            <a:tailEnd type="triangle"/>
+          </a:ln>
+        </p:spPr>
+        <p:style>
+          <a:lnRef idx="1">
+            <a:schemeClr val="accent1"/>
+          </a:lnRef>
+          <a:fillRef idx="0">
+            <a:schemeClr val="accent1"/>
+          </a:fillRef>
+          <a:effectRef idx="0">
+            <a:schemeClr val="accent1"/>
+          </a:effectRef>
+          <a:fontRef idx="minor">
+            <a:schemeClr val="tx1"/>
+          </a:fontRef>
+        </p:style>
+      </p:cxnSp>
+      <p:sp>
+        <p:nvSpPr>
+          <p:cNvPr id="83" name="TextBox 82"/>
+          <p:cNvSpPr txBox="1"/>
+          <p:nvPr/>
+        </p:nvSpPr>
+        <p:spPr>
+          <a:xfrm>
+            <a:off x="8250899" y="2795305"/>
+            <a:ext cx="1295869" cy="430887"/>
+          </a:xfrm>
+          <a:prstGeom prst="rect">
+            <a:avLst/>
+          </a:prstGeom>
+          <a:noFill/>
+        </p:spPr>
+        <p:txBody>
+          <a:bodyPr wrap="square" rtlCol="0">
+            <a:spAutoFit/>
+          </a:bodyPr>
+          <a:lstStyle/>
+          <a:p>
+            <a:r>
+              <a:rPr lang="en-US" sz="1100" dirty="0" err="1" smtClean="0"/>
+              <a:t>Chọn</a:t>
+            </a:r>
+            <a:r>
+              <a:rPr lang="en-US" sz="1100" dirty="0" smtClean="0"/>
+              <a:t> tab “</a:t>
+            </a:r>
+            <a:r>
+              <a:rPr lang="en-US" sz="1100" dirty="0" err="1" smtClean="0"/>
+              <a:t>Xem</a:t>
+            </a:r>
+            <a:r>
+              <a:rPr lang="en-US" sz="1100" dirty="0" smtClean="0"/>
+              <a:t> </a:t>
+            </a:r>
+            <a:r>
+              <a:rPr lang="en-US" sz="1100" dirty="0" err="1" smtClean="0"/>
+              <a:t>sản</a:t>
+            </a:r>
+            <a:r>
+              <a:rPr lang="en-US" sz="1100" dirty="0" smtClean="0"/>
+              <a:t> </a:t>
+            </a:r>
+            <a:r>
+              <a:rPr lang="en-US" sz="1100" dirty="0" err="1" smtClean="0"/>
+              <a:t>phẩm</a:t>
+            </a:r>
+            <a:r>
+              <a:rPr lang="en-US" sz="1100" dirty="0" smtClean="0"/>
+              <a:t> </a:t>
+            </a:r>
+            <a:r>
+              <a:rPr lang="en-US" sz="1100" dirty="0" err="1" smtClean="0"/>
+              <a:t>bán</a:t>
+            </a:r>
+            <a:r>
+              <a:rPr lang="en-US" sz="1100" dirty="0" smtClean="0"/>
+              <a:t> </a:t>
+            </a:r>
+            <a:r>
+              <a:rPr lang="en-US" sz="1100" dirty="0" err="1" smtClean="0"/>
+              <a:t>được</a:t>
             </a:r>
             <a:r>
               <a:rPr lang="en-US" sz="1100" dirty="0" smtClean="0"/>

</xml_diff>

<commit_message>
Đổi Use case Diagram như thầy góp ý
</commit_message>
<xml_diff>
--- a/Screen Design document/Screen_Diagram.pptx
+++ b/Screen Design document/Screen_Diagram.pptx
@@ -243,7 +243,7 @@
           <a:p>
             <a:fld id="{49291495-F709-4C09-B1B6-B97169AFAC42}" type="datetimeFigureOut">
               <a:rPr lang="en-US" smtClean="0"/>
-              <a:t>16/03/2017</a:t>
+              <a:t>17/03/2017</a:t>
             </a:fld>
             <a:endParaRPr lang="en-US"/>
           </a:p>
@@ -413,7 +413,7 @@
           <a:p>
             <a:fld id="{49291495-F709-4C09-B1B6-B97169AFAC42}" type="datetimeFigureOut">
               <a:rPr lang="en-US" smtClean="0"/>
-              <a:t>16/03/2017</a:t>
+              <a:t>17/03/2017</a:t>
             </a:fld>
             <a:endParaRPr lang="en-US"/>
           </a:p>
@@ -593,7 +593,7 @@
           <a:p>
             <a:fld id="{49291495-F709-4C09-B1B6-B97169AFAC42}" type="datetimeFigureOut">
               <a:rPr lang="en-US" smtClean="0"/>
-              <a:t>16/03/2017</a:t>
+              <a:t>17/03/2017</a:t>
             </a:fld>
             <a:endParaRPr lang="en-US"/>
           </a:p>
@@ -763,7 +763,7 @@
           <a:p>
             <a:fld id="{49291495-F709-4C09-B1B6-B97169AFAC42}" type="datetimeFigureOut">
               <a:rPr lang="en-US" smtClean="0"/>
-              <a:t>16/03/2017</a:t>
+              <a:t>17/03/2017</a:t>
             </a:fld>
             <a:endParaRPr lang="en-US"/>
           </a:p>
@@ -1009,7 +1009,7 @@
           <a:p>
             <a:fld id="{49291495-F709-4C09-B1B6-B97169AFAC42}" type="datetimeFigureOut">
               <a:rPr lang="en-US" smtClean="0"/>
-              <a:t>16/03/2017</a:t>
+              <a:t>17/03/2017</a:t>
             </a:fld>
             <a:endParaRPr lang="en-US"/>
           </a:p>
@@ -1241,7 +1241,7 @@
           <a:p>
             <a:fld id="{49291495-F709-4C09-B1B6-B97169AFAC42}" type="datetimeFigureOut">
               <a:rPr lang="en-US" smtClean="0"/>
-              <a:t>16/03/2017</a:t>
+              <a:t>17/03/2017</a:t>
             </a:fld>
             <a:endParaRPr lang="en-US"/>
           </a:p>
@@ -1608,7 +1608,7 @@
           <a:p>
             <a:fld id="{49291495-F709-4C09-B1B6-B97169AFAC42}" type="datetimeFigureOut">
               <a:rPr lang="en-US" smtClean="0"/>
-              <a:t>16/03/2017</a:t>
+              <a:t>17/03/2017</a:t>
             </a:fld>
             <a:endParaRPr lang="en-US"/>
           </a:p>
@@ -1726,7 +1726,7 @@
           <a:p>
             <a:fld id="{49291495-F709-4C09-B1B6-B97169AFAC42}" type="datetimeFigureOut">
               <a:rPr lang="en-US" smtClean="0"/>
-              <a:t>16/03/2017</a:t>
+              <a:t>17/03/2017</a:t>
             </a:fld>
             <a:endParaRPr lang="en-US"/>
           </a:p>
@@ -1821,7 +1821,7 @@
           <a:p>
             <a:fld id="{49291495-F709-4C09-B1B6-B97169AFAC42}" type="datetimeFigureOut">
               <a:rPr lang="en-US" smtClean="0"/>
-              <a:t>16/03/2017</a:t>
+              <a:t>17/03/2017</a:t>
             </a:fld>
             <a:endParaRPr lang="en-US"/>
           </a:p>
@@ -2098,7 +2098,7 @@
           <a:p>
             <a:fld id="{49291495-F709-4C09-B1B6-B97169AFAC42}" type="datetimeFigureOut">
               <a:rPr lang="en-US" smtClean="0"/>
-              <a:t>16/03/2017</a:t>
+              <a:t>17/03/2017</a:t>
             </a:fld>
             <a:endParaRPr lang="en-US"/>
           </a:p>
@@ -2351,7 +2351,7 @@
           <a:p>
             <a:fld id="{49291495-F709-4C09-B1B6-B97169AFAC42}" type="datetimeFigureOut">
               <a:rPr lang="en-US" smtClean="0"/>
-              <a:t>16/03/2017</a:t>
+              <a:t>17/03/2017</a:t>
             </a:fld>
             <a:endParaRPr lang="en-US"/>
           </a:p>
@@ -2564,7 +2564,7 @@
           <a:p>
             <a:fld id="{49291495-F709-4C09-B1B6-B97169AFAC42}" type="datetimeFigureOut">
               <a:rPr lang="en-US" smtClean="0"/>
-              <a:t>16/03/2017</a:t>
+              <a:t>17/03/2017</a:t>
             </a:fld>
             <a:endParaRPr lang="en-US"/>
           </a:p>
@@ -3377,11 +3377,7 @@
             </a:r>
             <a:r>
               <a:rPr lang="en-US" sz="2000" dirty="0" err="1" smtClean="0"/>
-              <a:t>d</a:t>
-            </a:r>
-            <a:r>
-              <a:rPr lang="en-US" sz="2000" dirty="0" err="1" smtClean="0"/>
-              <a:t>oanh</a:t>
+              <a:t>doanh</a:t>
             </a:r>
             <a:r>
               <a:rPr lang="en-US" sz="2000" dirty="0" smtClean="0"/>
@@ -4085,15 +4081,7 @@
             </a:r>
             <a:r>
               <a:rPr lang="en-US" sz="2000" dirty="0" smtClean="0"/>
-              <a:t> </a:t>
-            </a:r>
-            <a:r>
-              <a:rPr lang="en-US" sz="2000" dirty="0" smtClean="0"/>
-              <a:t>tin</a:t>
-            </a:r>
-            <a:r>
-              <a:rPr lang="en-US" sz="2000" dirty="0" smtClean="0"/>
-              <a:t> </a:t>
+              <a:t> tin </a:t>
             </a:r>
             <a:r>
               <a:rPr lang="en-US" sz="2000" dirty="0" err="1" smtClean="0"/>
@@ -5371,7 +5359,7 @@
               <a:t>tồn</a:t>
             </a:r>
             <a:r>
-              <a:rPr lang="en-US" sz="2000" dirty="0" smtClean="0"/>
+              <a:rPr lang="en-US" sz="2000" dirty="0"/>
               <a:t> </a:t>
             </a:r>
             <a:r>
@@ -5443,30 +5431,34 @@
           <a:p>
             <a:r>
               <a:rPr lang="en-US" sz="1100" dirty="0" smtClean="0"/>
-              <a:t>Click “</a:t>
-            </a:r>
-            <a:r>
-              <a:rPr lang="en-US" sz="1100" dirty="0" err="1" smtClean="0"/>
-              <a:t>Thống</a:t>
-            </a:r>
-            <a:r>
-              <a:rPr lang="en-US" sz="1100" dirty="0" smtClean="0"/>
-              <a:t> </a:t>
-            </a:r>
-            <a:r>
-              <a:rPr lang="en-US" sz="1100" dirty="0" err="1" smtClean="0"/>
-              <a:t>kê</a:t>
-            </a:r>
-            <a:r>
-              <a:rPr lang="en-US" sz="1100" dirty="0" smtClean="0"/>
-              <a:t> </a:t>
-            </a:r>
-            <a:r>
-              <a:rPr lang="en-US" sz="1100" dirty="0" err="1" smtClean="0"/>
+              <a:t>Click </a:t>
+            </a:r>
+            <a:r>
+              <a:rPr lang="en-US" sz="1100" dirty="0"/>
+              <a:t>“</a:t>
+            </a:r>
+            <a:r>
+              <a:rPr lang="en-US" sz="1100" dirty="0" err="1"/>
+              <a:t>Tình</a:t>
+            </a:r>
+            <a:r>
+              <a:rPr lang="en-US" sz="1100" dirty="0"/>
+              <a:t> </a:t>
+            </a:r>
+            <a:r>
+              <a:rPr lang="en-US" sz="1100" dirty="0" err="1"/>
+              <a:t>hình</a:t>
+            </a:r>
+            <a:r>
+              <a:rPr lang="en-US" sz="1100" dirty="0"/>
+              <a:t> </a:t>
+            </a:r>
+            <a:r>
+              <a:rPr lang="en-US" sz="1100" dirty="0" err="1"/>
               <a:t>tồn</a:t>
             </a:r>
             <a:r>
-              <a:rPr lang="en-US" sz="1100" dirty="0" smtClean="0"/>
+              <a:rPr lang="en-US" sz="1100" dirty="0"/>
               <a:t> </a:t>
             </a:r>
             <a:r>
@@ -5477,6 +5469,7 @@
               <a:rPr lang="en-US" sz="1100" dirty="0" smtClean="0"/>
               <a:t>”</a:t>
             </a:r>
+            <a:endParaRPr lang="en-US" sz="1100" dirty="0" smtClean="0"/>
           </a:p>
         </p:txBody>
       </p:sp>
@@ -5663,7 +5656,6 @@
               <a:rPr lang="en-US" sz="1100" dirty="0" smtClean="0"/>
               <a:t>”</a:t>
             </a:r>
-            <a:endParaRPr lang="en-US" sz="1100" dirty="0" smtClean="0"/>
           </a:p>
         </p:txBody>
       </p:sp>

</xml_diff>